<commit_message>
Added fedback under construction message
</commit_message>
<xml_diff>
--- a/presentation/Система заказа еды.pptx
+++ b/presentation/Система заказа еды.pptx
@@ -224,7 +224,7 @@
             <a:pPr rtl="0"/>
             <a:fld id="{AD9C4667-D0EB-4182-A979-F1BD41F3D31E}" type="datetime1">
               <a:rPr lang="ru-RU" smtClean="0"/>
-              <a:t>19.02.2025</a:t>
+              <a:t>20.02.2025</a:t>
             </a:fld>
             <a:endParaRPr lang="ru-RU"/>
           </a:p>
@@ -406,7 +406,7 @@
             <a:pPr rtl="0"/>
             <a:fld id="{052E72FE-6225-48DC-96F7-A6D4A27B79B8}" type="datetime1">
               <a:rPr lang="ru-RU" noProof="0" smtClean="0"/>
-              <a:t>19.02.2025</a:t>
+              <a:t>20.02.2025</a:t>
             </a:fld>
             <a:endParaRPr lang="ru-RU" noProof="0"/>
           </a:p>
@@ -1702,7 +1702,7 @@
             <a:pPr rtl="0"/>
             <a:fld id="{8A5E3DB2-6224-4F87-96B2-901B51FC324F}" type="datetime1">
               <a:rPr lang="ru-RU" noProof="0" smtClean="0"/>
-              <a:t>19.02.2025</a:t>
+              <a:t>20.02.2025</a:t>
             </a:fld>
             <a:endParaRPr lang="ru-RU" noProof="0"/>
           </a:p>
@@ -1967,7 +1967,7 @@
             <a:pPr rtl="0"/>
             <a:fld id="{E0724630-BB87-4AF9-A3EB-1FC0B7D5A0A2}" type="datetime1">
               <a:rPr lang="ru-RU" noProof="0" smtClean="0"/>
-              <a:t>19.02.2025</a:t>
+              <a:t>20.02.2025</a:t>
             </a:fld>
             <a:endParaRPr lang="ru-RU" noProof="0"/>
           </a:p>
@@ -2205,7 +2205,7 @@
             <a:pPr rtl="0"/>
             <a:fld id="{3ED2A334-CAC3-41D9-9F20-8680444032ED}" type="datetime1">
               <a:rPr lang="ru-RU" noProof="0" smtClean="0"/>
-              <a:t>19.02.2025</a:t>
+              <a:t>20.02.2025</a:t>
             </a:fld>
             <a:endParaRPr lang="ru-RU" noProof="0"/>
           </a:p>
@@ -2448,7 +2448,7 @@
             <a:pPr rtl="0"/>
             <a:fld id="{2941335E-9FC5-4332-89A1-F61C26AF68B8}" type="datetime1">
               <a:rPr lang="ru-RU" noProof="0" smtClean="0"/>
-              <a:t>19.02.2025</a:t>
+              <a:t>20.02.2025</a:t>
             </a:fld>
             <a:endParaRPr lang="ru-RU" noProof="0"/>
           </a:p>
@@ -2759,7 +2759,7 @@
             <a:pPr rtl="0"/>
             <a:fld id="{79742827-D144-4B2C-B4EF-283D1A1D2ABE}" type="datetime1">
               <a:rPr lang="ru-RU" noProof="0" smtClean="0"/>
-              <a:t>19.02.2025</a:t>
+              <a:t>20.02.2025</a:t>
             </a:fld>
             <a:endParaRPr lang="ru-RU" noProof="0"/>
           </a:p>
@@ -3064,7 +3064,7 @@
             <a:pPr rtl="0"/>
             <a:fld id="{66134D18-76F3-4340-B8E3-CE0608B72693}" type="datetime1">
               <a:rPr lang="ru-RU" noProof="0" smtClean="0"/>
-              <a:t>19.02.2025</a:t>
+              <a:t>20.02.2025</a:t>
             </a:fld>
             <a:endParaRPr lang="ru-RU" noProof="0"/>
           </a:p>
@@ -3488,7 +3488,7 @@
             <a:pPr rtl="0"/>
             <a:fld id="{61B1DAD5-1ADC-4BAD-A5A2-B644A9983A58}" type="datetime1">
               <a:rPr lang="ru-RU" noProof="0" smtClean="0"/>
-              <a:t>19.02.2025</a:t>
+              <a:t>20.02.2025</a:t>
             </a:fld>
             <a:endParaRPr lang="ru-RU" noProof="0"/>
           </a:p>
@@ -3587,7 +3587,7 @@
             <a:pPr rtl="0"/>
             <a:fld id="{D34B273F-9A6A-422D-A6AB-3990B7538E9C}" type="datetime1">
               <a:rPr lang="ru-RU" noProof="0" smtClean="0"/>
-              <a:t>19.02.2025</a:t>
+              <a:t>20.02.2025</a:t>
             </a:fld>
             <a:endParaRPr lang="ru-RU" noProof="0"/>
           </a:p>
@@ -3753,7 +3753,7 @@
             <a:pPr rtl="0"/>
             <a:fld id="{0F026E7C-B2F6-41BB-9643-AACFC392E830}" type="datetime1">
               <a:rPr lang="ru-RU" noProof="0" smtClean="0"/>
-              <a:t>19.02.2025</a:t>
+              <a:t>20.02.2025</a:t>
             </a:fld>
             <a:endParaRPr lang="ru-RU" noProof="0"/>
           </a:p>
@@ -4134,7 +4134,7 @@
             <a:pPr rtl="0"/>
             <a:fld id="{72B0968A-0AED-4FB8-B40B-FB67848094BA}" type="datetime1">
               <a:rPr lang="ru-RU" noProof="0" smtClean="0"/>
-              <a:t>19.02.2025</a:t>
+              <a:t>20.02.2025</a:t>
             </a:fld>
             <a:endParaRPr lang="ru-RU" noProof="0"/>
           </a:p>
@@ -4427,7 +4427,7 @@
             <a:pPr rtl="0"/>
             <a:fld id="{0E1F5BCB-5907-4BE5-BDA8-E10478C468F1}" type="datetime1">
               <a:rPr lang="ru-RU" noProof="0" smtClean="0"/>
-              <a:t>19.02.2025</a:t>
+              <a:t>20.02.2025</a:t>
             </a:fld>
             <a:endParaRPr lang="ru-RU" noProof="0"/>
           </a:p>
@@ -4643,7 +4643,7 @@
             <a:fld id="{22E8C287-D018-43BB-961A-194062A1E79C}" type="datetime1">
               <a:rPr lang="ru-RU" smtClean="0"/>
               <a:pPr/>
-              <a:t>19.02.2025</a:t>
+              <a:t>20.02.2025</a:t>
             </a:fld>
             <a:endParaRPr lang="ru-RU"/>
           </a:p>
@@ -5720,6 +5720,65 @@
           </a:p>
         </p:txBody>
       </p:sp>
+      <p:sp>
+        <p:nvSpPr>
+          <p:cNvPr id="4" name="TextBox 3">
+            <a:extLst>
+              <a:ext uri="{FF2B5EF4-FFF2-40B4-BE49-F238E27FC236}">
+                <a16:creationId xmlns:a16="http://schemas.microsoft.com/office/drawing/2014/main" id="{486B1C89-2A02-2454-6723-93A1E5953CB0}"/>
+              </a:ext>
+            </a:extLst>
+          </p:cNvPr>
+          <p:cNvSpPr txBox="1"/>
+          <p:nvPr/>
+        </p:nvSpPr>
+        <p:spPr>
+          <a:xfrm>
+            <a:off x="8819535" y="6072832"/>
+            <a:ext cx="3372465" cy="461665"/>
+          </a:xfrm>
+          <a:prstGeom prst="rect">
+            <a:avLst/>
+          </a:prstGeom>
+          <a:noFill/>
+          <a:effectLst>
+            <a:glow rad="139700">
+              <a:schemeClr val="accent3">
+                <a:satMod val="175000"/>
+                <a:alpha val="40000"/>
+              </a:schemeClr>
+            </a:glow>
+          </a:effectLst>
+        </p:spPr>
+        <p:txBody>
+          <a:bodyPr wrap="square" rtlCol="0">
+            <a:spAutoFit/>
+          </a:bodyPr>
+          <a:lstStyle/>
+          <a:p>
+            <a:r>
+              <a:rPr lang="en-US" sz="2400" b="1" dirty="0">
+                <a:solidFill>
+                  <a:schemeClr val="bg1"/>
+                </a:solidFill>
+                <a:effectLst>
+                  <a:glow rad="228600">
+                    <a:schemeClr val="tx1">
+                      <a:alpha val="40000"/>
+                    </a:schemeClr>
+                  </a:glow>
+                  <a:outerShdw blurRad="50800" dist="38100" dir="5400000" algn="t" rotWithShape="0">
+                    <a:prstClr val="black">
+                      <a:alpha val="40000"/>
+                    </a:prstClr>
+                  </a:outerShdw>
+                </a:effectLst>
+              </a:rPr>
+              <a:t>@BISTRO_MY_bot</a:t>
+            </a:r>
+          </a:p>
+        </p:txBody>
+      </p:sp>
     </p:spTree>
     <p:extLst>
       <p:ext uri="{BB962C8B-B14F-4D97-AF65-F5344CB8AC3E}">
@@ -6343,6 +6402,65 @@
           </a:p>
         </p:txBody>
       </p:sp>
+      <p:sp>
+        <p:nvSpPr>
+          <p:cNvPr id="3" name="TextBox 2">
+            <a:extLst>
+              <a:ext uri="{FF2B5EF4-FFF2-40B4-BE49-F238E27FC236}">
+                <a16:creationId xmlns:a16="http://schemas.microsoft.com/office/drawing/2014/main" id="{F4B51A8C-058E-9B34-59EB-FCBEE9075ACF}"/>
+              </a:ext>
+            </a:extLst>
+          </p:cNvPr>
+          <p:cNvSpPr txBox="1"/>
+          <p:nvPr/>
+        </p:nvSpPr>
+        <p:spPr>
+          <a:xfrm>
+            <a:off x="8819535" y="6072832"/>
+            <a:ext cx="3372465" cy="461665"/>
+          </a:xfrm>
+          <a:prstGeom prst="rect">
+            <a:avLst/>
+          </a:prstGeom>
+          <a:noFill/>
+          <a:effectLst>
+            <a:glow rad="139700">
+              <a:schemeClr val="accent3">
+                <a:satMod val="175000"/>
+                <a:alpha val="40000"/>
+              </a:schemeClr>
+            </a:glow>
+          </a:effectLst>
+        </p:spPr>
+        <p:txBody>
+          <a:bodyPr wrap="square" rtlCol="0">
+            <a:spAutoFit/>
+          </a:bodyPr>
+          <a:lstStyle/>
+          <a:p>
+            <a:r>
+              <a:rPr lang="en-US" sz="2400" b="1" dirty="0">
+                <a:solidFill>
+                  <a:schemeClr val="bg1"/>
+                </a:solidFill>
+                <a:effectLst>
+                  <a:glow rad="228600">
+                    <a:schemeClr val="tx1">
+                      <a:alpha val="40000"/>
+                    </a:schemeClr>
+                  </a:glow>
+                  <a:outerShdw blurRad="50800" dist="38100" dir="5400000" algn="t" rotWithShape="0">
+                    <a:prstClr val="black">
+                      <a:alpha val="40000"/>
+                    </a:prstClr>
+                  </a:outerShdw>
+                </a:effectLst>
+              </a:rPr>
+              <a:t>@BISTRO_MY_bot</a:t>
+            </a:r>
+          </a:p>
+        </p:txBody>
+      </p:sp>
     </p:spTree>
     <p:extLst>
       <p:ext uri="{BB962C8B-B14F-4D97-AF65-F5344CB8AC3E}">
@@ -6539,6 +6657,65 @@
             <a:r>
               <a:rPr lang="ru-RU" dirty="0"/>
               <a:t>Снижение нагрузки на персонал</a:t>
+            </a:r>
+          </a:p>
+        </p:txBody>
+      </p:sp>
+      <p:sp>
+        <p:nvSpPr>
+          <p:cNvPr id="3" name="TextBox 2">
+            <a:extLst>
+              <a:ext uri="{FF2B5EF4-FFF2-40B4-BE49-F238E27FC236}">
+                <a16:creationId xmlns:a16="http://schemas.microsoft.com/office/drawing/2014/main" id="{E4CE3358-B2BD-FDDF-B895-D605D191C7AF}"/>
+              </a:ext>
+            </a:extLst>
+          </p:cNvPr>
+          <p:cNvSpPr txBox="1"/>
+          <p:nvPr/>
+        </p:nvSpPr>
+        <p:spPr>
+          <a:xfrm>
+            <a:off x="8819535" y="6072832"/>
+            <a:ext cx="3372465" cy="461665"/>
+          </a:xfrm>
+          <a:prstGeom prst="rect">
+            <a:avLst/>
+          </a:prstGeom>
+          <a:noFill/>
+          <a:effectLst>
+            <a:glow rad="139700">
+              <a:schemeClr val="accent3">
+                <a:satMod val="175000"/>
+                <a:alpha val="40000"/>
+              </a:schemeClr>
+            </a:glow>
+          </a:effectLst>
+        </p:spPr>
+        <p:txBody>
+          <a:bodyPr wrap="square" rtlCol="0">
+            <a:spAutoFit/>
+          </a:bodyPr>
+          <a:lstStyle/>
+          <a:p>
+            <a:r>
+              <a:rPr lang="en-US" sz="2400" b="1" dirty="0">
+                <a:solidFill>
+                  <a:schemeClr val="bg1"/>
+                </a:solidFill>
+                <a:effectLst>
+                  <a:glow rad="228600">
+                    <a:schemeClr val="tx1">
+                      <a:alpha val="40000"/>
+                    </a:schemeClr>
+                  </a:glow>
+                  <a:outerShdw blurRad="50800" dist="38100" dir="5400000" algn="t" rotWithShape="0">
+                    <a:prstClr val="black">
+                      <a:alpha val="40000"/>
+                    </a:prstClr>
+                  </a:outerShdw>
+                </a:effectLst>
+              </a:rPr>
+              <a:t>@BISTRO_MY_bot</a:t>
             </a:r>
           </a:p>
         </p:txBody>
@@ -6755,6 +6932,65 @@
           </a:p>
         </p:txBody>
       </p:sp>
+      <p:sp>
+        <p:nvSpPr>
+          <p:cNvPr id="3" name="TextBox 2">
+            <a:extLst>
+              <a:ext uri="{FF2B5EF4-FFF2-40B4-BE49-F238E27FC236}">
+                <a16:creationId xmlns:a16="http://schemas.microsoft.com/office/drawing/2014/main" id="{10036DD2-1450-12FC-FB61-02AD8923235F}"/>
+              </a:ext>
+            </a:extLst>
+          </p:cNvPr>
+          <p:cNvSpPr txBox="1"/>
+          <p:nvPr/>
+        </p:nvSpPr>
+        <p:spPr>
+          <a:xfrm>
+            <a:off x="8819535" y="6072832"/>
+            <a:ext cx="3372465" cy="461665"/>
+          </a:xfrm>
+          <a:prstGeom prst="rect">
+            <a:avLst/>
+          </a:prstGeom>
+          <a:noFill/>
+          <a:effectLst>
+            <a:glow rad="139700">
+              <a:schemeClr val="accent3">
+                <a:satMod val="175000"/>
+                <a:alpha val="40000"/>
+              </a:schemeClr>
+            </a:glow>
+          </a:effectLst>
+        </p:spPr>
+        <p:txBody>
+          <a:bodyPr wrap="square" rtlCol="0">
+            <a:spAutoFit/>
+          </a:bodyPr>
+          <a:lstStyle/>
+          <a:p>
+            <a:r>
+              <a:rPr lang="en-US" sz="2400" b="1" dirty="0">
+                <a:solidFill>
+                  <a:schemeClr val="bg1"/>
+                </a:solidFill>
+                <a:effectLst>
+                  <a:glow rad="228600">
+                    <a:schemeClr val="tx1">
+                      <a:alpha val="40000"/>
+                    </a:schemeClr>
+                  </a:glow>
+                  <a:outerShdw blurRad="50800" dist="38100" dir="5400000" algn="t" rotWithShape="0">
+                    <a:prstClr val="black">
+                      <a:alpha val="40000"/>
+                    </a:prstClr>
+                  </a:outerShdw>
+                </a:effectLst>
+              </a:rPr>
+              <a:t>@BISTRO_MY_bot</a:t>
+            </a:r>
+          </a:p>
+        </p:txBody>
+      </p:sp>
     </p:spTree>
     <p:extLst>
       <p:ext uri="{BB962C8B-B14F-4D97-AF65-F5344CB8AC3E}">
@@ -6977,6 +7213,65 @@
           </a:p>
         </p:txBody>
       </p:sp>
+      <p:sp>
+        <p:nvSpPr>
+          <p:cNvPr id="3" name="TextBox 2">
+            <a:extLst>
+              <a:ext uri="{FF2B5EF4-FFF2-40B4-BE49-F238E27FC236}">
+                <a16:creationId xmlns:a16="http://schemas.microsoft.com/office/drawing/2014/main" id="{CD7F1441-5E4A-D740-3C1B-EE528B439862}"/>
+              </a:ext>
+            </a:extLst>
+          </p:cNvPr>
+          <p:cNvSpPr txBox="1"/>
+          <p:nvPr/>
+        </p:nvSpPr>
+        <p:spPr>
+          <a:xfrm>
+            <a:off x="8819535" y="6072832"/>
+            <a:ext cx="3372465" cy="461665"/>
+          </a:xfrm>
+          <a:prstGeom prst="rect">
+            <a:avLst/>
+          </a:prstGeom>
+          <a:noFill/>
+          <a:effectLst>
+            <a:glow rad="139700">
+              <a:schemeClr val="accent3">
+                <a:satMod val="175000"/>
+                <a:alpha val="40000"/>
+              </a:schemeClr>
+            </a:glow>
+          </a:effectLst>
+        </p:spPr>
+        <p:txBody>
+          <a:bodyPr wrap="square" rtlCol="0">
+            <a:spAutoFit/>
+          </a:bodyPr>
+          <a:lstStyle/>
+          <a:p>
+            <a:r>
+              <a:rPr lang="en-US" sz="2400" b="1" dirty="0">
+                <a:solidFill>
+                  <a:schemeClr val="bg1"/>
+                </a:solidFill>
+                <a:effectLst>
+                  <a:glow rad="228600">
+                    <a:schemeClr val="tx1">
+                      <a:alpha val="40000"/>
+                    </a:schemeClr>
+                  </a:glow>
+                  <a:outerShdw blurRad="50800" dist="38100" dir="5400000" algn="t" rotWithShape="0">
+                    <a:prstClr val="black">
+                      <a:alpha val="40000"/>
+                    </a:prstClr>
+                  </a:outerShdw>
+                </a:effectLst>
+              </a:rPr>
+              <a:t>@BISTRO_MY_bot</a:t>
+            </a:r>
+          </a:p>
+        </p:txBody>
+      </p:sp>
     </p:spTree>
     <p:extLst>
       <p:ext uri="{BB962C8B-B14F-4D97-AF65-F5344CB8AC3E}">
@@ -7196,6 +7491,65 @@
           </a:p>
         </p:txBody>
       </p:sp>
+      <p:sp>
+        <p:nvSpPr>
+          <p:cNvPr id="3" name="TextBox 2">
+            <a:extLst>
+              <a:ext uri="{FF2B5EF4-FFF2-40B4-BE49-F238E27FC236}">
+                <a16:creationId xmlns:a16="http://schemas.microsoft.com/office/drawing/2014/main" id="{55E36700-95CA-2DA3-8C3F-E8F70582ED27}"/>
+              </a:ext>
+            </a:extLst>
+          </p:cNvPr>
+          <p:cNvSpPr txBox="1"/>
+          <p:nvPr/>
+        </p:nvSpPr>
+        <p:spPr>
+          <a:xfrm>
+            <a:off x="8819535" y="6072832"/>
+            <a:ext cx="3372465" cy="461665"/>
+          </a:xfrm>
+          <a:prstGeom prst="rect">
+            <a:avLst/>
+          </a:prstGeom>
+          <a:noFill/>
+          <a:effectLst>
+            <a:glow rad="139700">
+              <a:schemeClr val="accent3">
+                <a:satMod val="175000"/>
+                <a:alpha val="40000"/>
+              </a:schemeClr>
+            </a:glow>
+          </a:effectLst>
+        </p:spPr>
+        <p:txBody>
+          <a:bodyPr wrap="square" rtlCol="0">
+            <a:spAutoFit/>
+          </a:bodyPr>
+          <a:lstStyle/>
+          <a:p>
+            <a:r>
+              <a:rPr lang="en-US" sz="2400" b="1" dirty="0">
+                <a:solidFill>
+                  <a:schemeClr val="bg1"/>
+                </a:solidFill>
+                <a:effectLst>
+                  <a:glow rad="228600">
+                    <a:schemeClr val="tx1">
+                      <a:alpha val="40000"/>
+                    </a:schemeClr>
+                  </a:glow>
+                  <a:outerShdw blurRad="50800" dist="38100" dir="5400000" algn="t" rotWithShape="0">
+                    <a:prstClr val="black">
+                      <a:alpha val="40000"/>
+                    </a:prstClr>
+                  </a:outerShdw>
+                </a:effectLst>
+              </a:rPr>
+              <a:t>@BISTRO_MY_bot</a:t>
+            </a:r>
+          </a:p>
+        </p:txBody>
+      </p:sp>
     </p:spTree>
     <p:extLst>
       <p:ext uri="{BB962C8B-B14F-4D97-AF65-F5344CB8AC3E}">
@@ -7404,6 +7758,65 @@
             <a:r>
               <a:rPr lang="ru-RU" dirty="0"/>
               <a:t>📈 Масштабируемость</a:t>
+            </a:r>
+          </a:p>
+        </p:txBody>
+      </p:sp>
+      <p:sp>
+        <p:nvSpPr>
+          <p:cNvPr id="3" name="TextBox 2">
+            <a:extLst>
+              <a:ext uri="{FF2B5EF4-FFF2-40B4-BE49-F238E27FC236}">
+                <a16:creationId xmlns:a16="http://schemas.microsoft.com/office/drawing/2014/main" id="{761D3D7A-A6EF-9508-6ABD-ABE6E54513F6}"/>
+              </a:ext>
+            </a:extLst>
+          </p:cNvPr>
+          <p:cNvSpPr txBox="1"/>
+          <p:nvPr/>
+        </p:nvSpPr>
+        <p:spPr>
+          <a:xfrm>
+            <a:off x="8819535" y="6072832"/>
+            <a:ext cx="3372465" cy="461665"/>
+          </a:xfrm>
+          <a:prstGeom prst="rect">
+            <a:avLst/>
+          </a:prstGeom>
+          <a:noFill/>
+          <a:effectLst>
+            <a:glow rad="139700">
+              <a:schemeClr val="accent3">
+                <a:satMod val="175000"/>
+                <a:alpha val="40000"/>
+              </a:schemeClr>
+            </a:glow>
+          </a:effectLst>
+        </p:spPr>
+        <p:txBody>
+          <a:bodyPr wrap="square" rtlCol="0">
+            <a:spAutoFit/>
+          </a:bodyPr>
+          <a:lstStyle/>
+          <a:p>
+            <a:r>
+              <a:rPr lang="en-US" sz="2400" b="1" dirty="0">
+                <a:solidFill>
+                  <a:schemeClr val="bg1"/>
+                </a:solidFill>
+                <a:effectLst>
+                  <a:glow rad="228600">
+                    <a:schemeClr val="tx1">
+                      <a:alpha val="40000"/>
+                    </a:schemeClr>
+                  </a:glow>
+                  <a:outerShdw blurRad="50800" dist="38100" dir="5400000" algn="t" rotWithShape="0">
+                    <a:prstClr val="black">
+                      <a:alpha val="40000"/>
+                    </a:prstClr>
+                  </a:outerShdw>
+                </a:effectLst>
+              </a:rPr>
+              <a:t>@BISTRO_MY_bot</a:t>
             </a:r>
           </a:p>
         </p:txBody>
@@ -7969,6 +8382,65 @@
           </a:prstGeom>
         </p:spPr>
       </p:pic>
+      <p:sp>
+        <p:nvSpPr>
+          <p:cNvPr id="4" name="TextBox 3">
+            <a:extLst>
+              <a:ext uri="{FF2B5EF4-FFF2-40B4-BE49-F238E27FC236}">
+                <a16:creationId xmlns:a16="http://schemas.microsoft.com/office/drawing/2014/main" id="{D2ECFF25-68C1-BE33-83F6-1C5A4BA83FC7}"/>
+              </a:ext>
+            </a:extLst>
+          </p:cNvPr>
+          <p:cNvSpPr txBox="1"/>
+          <p:nvPr/>
+        </p:nvSpPr>
+        <p:spPr>
+          <a:xfrm>
+            <a:off x="8469999" y="5867621"/>
+            <a:ext cx="3372465" cy="461665"/>
+          </a:xfrm>
+          <a:prstGeom prst="rect">
+            <a:avLst/>
+          </a:prstGeom>
+          <a:noFill/>
+          <a:effectLst>
+            <a:glow rad="139700">
+              <a:schemeClr val="accent3">
+                <a:satMod val="175000"/>
+                <a:alpha val="40000"/>
+              </a:schemeClr>
+            </a:glow>
+          </a:effectLst>
+        </p:spPr>
+        <p:txBody>
+          <a:bodyPr wrap="square" rtlCol="0">
+            <a:spAutoFit/>
+          </a:bodyPr>
+          <a:lstStyle/>
+          <a:p>
+            <a:r>
+              <a:rPr lang="en-US" sz="2400" b="1" dirty="0">
+                <a:solidFill>
+                  <a:schemeClr val="bg1"/>
+                </a:solidFill>
+                <a:effectLst>
+                  <a:glow rad="228600">
+                    <a:schemeClr val="tx1">
+                      <a:alpha val="40000"/>
+                    </a:schemeClr>
+                  </a:glow>
+                  <a:outerShdw blurRad="50800" dist="38100" dir="5400000" algn="t" rotWithShape="0">
+                    <a:prstClr val="black">
+                      <a:alpha val="40000"/>
+                    </a:prstClr>
+                  </a:outerShdw>
+                </a:effectLst>
+              </a:rPr>
+              <a:t>@BISTRO_MY_bot</a:t>
+            </a:r>
+          </a:p>
+        </p:txBody>
+      </p:sp>
     </p:spTree>
     <p:extLst>
       <p:ext uri="{BB962C8B-B14F-4D97-AF65-F5344CB8AC3E}">

</xml_diff>